<commit_message>
Docu begin and expanded dataset
</commit_message>
<xml_diff>
--- a/PitchDeck.pptx
+++ b/PitchDeck.pptx
@@ -114,6 +114,11 @@
       </a:defRPr>
     </a:lvl9pPr>
   </p:defaultTextStyle>
+  <p:extLst>
+    <p:ext uri="{EFAFB233-063F-42B5-8137-9DF3F51BA10A}">
+      <p15:sldGuideLst xmlns:p15="http://schemas.microsoft.com/office/powerpoint/2012/main"/>
+    </p:ext>
+  </p:extLst>
 </p:presentation>
 </file>
 
@@ -3796,7 +3801,7 @@
           <a:p>
             <a:r>
               <a:rPr lang="en-US" dirty="0"/>
-              <a:t>How to know what amount of kg is exported and imported in the next months? </a:t>
+              <a:t>Problem: How to know what amount of kg is exported and imported in the next months? </a:t>
             </a:r>
           </a:p>
         </p:txBody>
@@ -3826,6 +3831,9 @@
               <a:rPr lang="en-US" dirty="0"/>
               <a:t>To be able to not make more or less then the amount ultimately sold</a:t>
             </a:r>
+          </a:p>
+          <a:p>
+            <a:endParaRPr lang="en-US" dirty="0"/>
           </a:p>
         </p:txBody>
       </p:sp>
@@ -3908,6 +3916,20 @@
           <a:bodyPr/>
           <a:lstStyle/>
           <a:p>
+            <a:r>
+              <a:rPr lang="en-US" dirty="0"/>
+              <a:t>Predicting 4 months: October 2025 – January 2026</a:t>
+            </a:r>
+          </a:p>
+          <a:p>
+            <a:r>
+              <a:rPr lang="en-US" dirty="0"/>
+              <a:t>Only get October 2025 data available in time for presentation so we will use this to see how accurate </a:t>
+            </a:r>
+            <a:r>
+              <a:rPr lang="en-US"/>
+              <a:t>our prediction is</a:t>
+            </a:r>
             <a:endParaRPr lang="en-US" dirty="0"/>
           </a:p>
         </p:txBody>

</xml_diff>